<commit_message>
Slides UI & Client Prozess Diagramme
</commit_message>
<xml_diff>
--- a/Dokumentation/Präsentation.pptx
+++ b/Dokumentation/Präsentation.pptx
@@ -11,10 +11,14 @@
     <p:sldId id="260" r:id="rId5"/>
     <p:sldId id="258" r:id="rId6"/>
     <p:sldId id="259" r:id="rId7"/>
-    <p:sldId id="262" r:id="rId8"/>
-    <p:sldId id="263" r:id="rId9"/>
-    <p:sldId id="264" r:id="rId10"/>
-    <p:sldId id="265" r:id="rId11"/>
+    <p:sldId id="266" r:id="rId8"/>
+    <p:sldId id="267" r:id="rId9"/>
+    <p:sldId id="268" r:id="rId10"/>
+    <p:sldId id="269" r:id="rId11"/>
+    <p:sldId id="262" r:id="rId12"/>
+    <p:sldId id="263" r:id="rId13"/>
+    <p:sldId id="264" r:id="rId14"/>
+    <p:sldId id="265" r:id="rId15"/>
   </p:sldIdLst>
   <p:sldSz cx="12192000" cy="6858000"/>
   <p:notesSz cx="6858000" cy="9144000"/>
@@ -637,7 +641,7 @@
             <a:fld id="{B61BEF0D-F0BB-DE4B-95CE-6DB70DBA9567}" type="datetimeFigureOut">
               <a:rPr lang="en-US" dirty="0"/>
               <a:pPr/>
-              <a:t>6/21/2015</a:t>
+              <a:t>6/22/2015</a:t>
             </a:fld>
             <a:endParaRPr lang="en-US" dirty="0"/>
           </a:p>
@@ -685,7 +689,7 @@
             <a:fld id="{D57F1E4F-1CFF-5643-939E-217C01CDF565}" type="slidenum">
               <a:rPr lang="en-US" dirty="0"/>
               <a:pPr/>
-              <a:t>‹#›</a:t>
+              <a:t>‹Nr.›</a:t>
             </a:fld>
             <a:endParaRPr lang="en-US" dirty="0"/>
           </a:p>
@@ -967,7 +971,7 @@
             <a:fld id="{B61BEF0D-F0BB-DE4B-95CE-6DB70DBA9567}" type="datetimeFigureOut">
               <a:rPr lang="en-US" dirty="0"/>
               <a:pPr/>
-              <a:t>6/21/2015</a:t>
+              <a:t>6/22/2015</a:t>
             </a:fld>
             <a:endParaRPr lang="en-US" dirty="0"/>
           </a:p>
@@ -1010,7 +1014,7 @@
             <a:fld id="{D57F1E4F-1CFF-5643-939E-217C01CDF565}" type="slidenum">
               <a:rPr lang="en-US" dirty="0"/>
               <a:pPr/>
-              <a:t>‹#›</a:t>
+              <a:t>‹Nr.›</a:t>
             </a:fld>
             <a:endParaRPr lang="en-US" dirty="0"/>
           </a:p>
@@ -1249,7 +1253,7 @@
             <a:fld id="{B61BEF0D-F0BB-DE4B-95CE-6DB70DBA9567}" type="datetimeFigureOut">
               <a:rPr lang="en-US" dirty="0"/>
               <a:pPr/>
-              <a:t>6/21/2015</a:t>
+              <a:t>6/22/2015</a:t>
             </a:fld>
             <a:endParaRPr lang="en-US" dirty="0"/>
           </a:p>
@@ -1292,7 +1296,7 @@
             <a:fld id="{D57F1E4F-1CFF-5643-939E-217C01CDF565}" type="slidenum">
               <a:rPr lang="en-US" dirty="0"/>
               <a:pPr/>
-              <a:t>‹#›</a:t>
+              <a:t>‹Nr.›</a:t>
             </a:fld>
             <a:endParaRPr lang="en-US" dirty="0"/>
           </a:p>
@@ -1823,7 +1827,7 @@
             <a:fld id="{B61BEF0D-F0BB-DE4B-95CE-6DB70DBA9567}" type="datetimeFigureOut">
               <a:rPr lang="en-US" dirty="0"/>
               <a:pPr/>
-              <a:t>6/21/2015</a:t>
+              <a:t>6/22/2015</a:t>
             </a:fld>
             <a:endParaRPr lang="en-US" dirty="0"/>
           </a:p>
@@ -1866,7 +1870,7 @@
             <a:fld id="{D57F1E4F-1CFF-5643-939E-217C01CDF565}" type="slidenum">
               <a:rPr lang="en-US" dirty="0"/>
               <a:pPr/>
-              <a:t>‹#›</a:t>
+              <a:t>‹Nr.›</a:t>
             </a:fld>
             <a:endParaRPr lang="en-US" dirty="0"/>
           </a:p>
@@ -2105,7 +2109,7 @@
             <a:fld id="{B61BEF0D-F0BB-DE4B-95CE-6DB70DBA9567}" type="datetimeFigureOut">
               <a:rPr lang="en-US" dirty="0"/>
               <a:pPr/>
-              <a:t>6/21/2015</a:t>
+              <a:t>6/22/2015</a:t>
             </a:fld>
             <a:endParaRPr lang="en-US" dirty="0"/>
           </a:p>
@@ -2148,7 +2152,7 @@
             <a:fld id="{D57F1E4F-1CFF-5643-939E-217C01CDF565}" type="slidenum">
               <a:rPr lang="en-US" dirty="0"/>
               <a:pPr/>
-              <a:t>‹#›</a:t>
+              <a:t>‹Nr.›</a:t>
             </a:fld>
             <a:endParaRPr lang="en-US" dirty="0"/>
           </a:p>
@@ -2671,7 +2675,7 @@
             <a:fld id="{B61BEF0D-F0BB-DE4B-95CE-6DB70DBA9567}" type="datetimeFigureOut">
               <a:rPr lang="en-US" dirty="0"/>
               <a:pPr/>
-              <a:t>6/21/2015</a:t>
+              <a:t>6/22/2015</a:t>
             </a:fld>
             <a:endParaRPr lang="en-US" dirty="0"/>
           </a:p>
@@ -2714,7 +2718,7 @@
             <a:fld id="{D57F1E4F-1CFF-5643-939E-217C01CDF565}" type="slidenum">
               <a:rPr lang="en-US" dirty="0"/>
               <a:pPr/>
-              <a:t>‹#›</a:t>
+              <a:t>‹Nr.›</a:t>
             </a:fld>
             <a:endParaRPr lang="en-US" dirty="0"/>
           </a:p>
@@ -3002,7 +3006,7 @@
             <a:fld id="{B61BEF0D-F0BB-DE4B-95CE-6DB70DBA9567}" type="datetimeFigureOut">
               <a:rPr lang="en-US" dirty="0"/>
               <a:pPr/>
-              <a:t>6/21/2015</a:t>
+              <a:t>6/22/2015</a:t>
             </a:fld>
             <a:endParaRPr lang="en-US" dirty="0"/>
           </a:p>
@@ -3045,7 +3049,7 @@
             <a:fld id="{D57F1E4F-1CFF-5643-939E-217C01CDF565}" type="slidenum">
               <a:rPr lang="en-US" dirty="0"/>
               <a:pPr/>
-              <a:t>‹#›</a:t>
+              <a:t>‹Nr.›</a:t>
             </a:fld>
             <a:endParaRPr lang="en-US" dirty="0"/>
           </a:p>
@@ -3210,7 +3214,7 @@
             <a:fld id="{B61BEF0D-F0BB-DE4B-95CE-6DB70DBA9567}" type="datetimeFigureOut">
               <a:rPr lang="en-US" dirty="0"/>
               <a:pPr/>
-              <a:t>6/21/2015</a:t>
+              <a:t>6/22/2015</a:t>
             </a:fld>
             <a:endParaRPr lang="en-US" dirty="0"/>
           </a:p>
@@ -3253,7 +3257,7 @@
             <a:fld id="{D57F1E4F-1CFF-5643-939E-217C01CDF565}" type="slidenum">
               <a:rPr lang="en-US" dirty="0"/>
               <a:pPr/>
-              <a:t>‹#›</a:t>
+              <a:t>‹Nr.›</a:t>
             </a:fld>
             <a:endParaRPr lang="en-US" dirty="0"/>
           </a:p>
@@ -3424,7 +3428,7 @@
             <a:fld id="{B61BEF0D-F0BB-DE4B-95CE-6DB70DBA9567}" type="datetimeFigureOut">
               <a:rPr lang="en-US" dirty="0"/>
               <a:pPr/>
-              <a:t>6/21/2015</a:t>
+              <a:t>6/22/2015</a:t>
             </a:fld>
             <a:endParaRPr lang="en-US" dirty="0"/>
           </a:p>
@@ -3467,7 +3471,7 @@
             <a:fld id="{D57F1E4F-1CFF-5643-939E-217C01CDF565}" type="slidenum">
               <a:rPr lang="en-US" dirty="0"/>
               <a:pPr/>
-              <a:t>‹#›</a:t>
+              <a:t>‹Nr.›</a:t>
             </a:fld>
             <a:endParaRPr lang="en-US" dirty="0"/>
           </a:p>
@@ -3665,7 +3669,7 @@
             <a:fld id="{B61BEF0D-F0BB-DE4B-95CE-6DB70DBA9567}" type="datetimeFigureOut">
               <a:rPr lang="en-US" dirty="0"/>
               <a:pPr/>
-              <a:t>6/21/2015</a:t>
+              <a:t>6/22/2015</a:t>
             </a:fld>
             <a:endParaRPr lang="en-US" dirty="0"/>
           </a:p>
@@ -3713,7 +3717,7 @@
             <a:fld id="{D57F1E4F-1CFF-5643-939E-217C01CDF565}" type="slidenum">
               <a:rPr lang="en-US" dirty="0"/>
               <a:pPr/>
-              <a:t>‹#›</a:t>
+              <a:t>‹Nr.›</a:t>
             </a:fld>
             <a:endParaRPr lang="en-US" dirty="0"/>
           </a:p>
@@ -3952,7 +3956,7 @@
             <a:fld id="{B61BEF0D-F0BB-DE4B-95CE-6DB70DBA9567}" type="datetimeFigureOut">
               <a:rPr lang="en-US" dirty="0"/>
               <a:pPr/>
-              <a:t>6/21/2015</a:t>
+              <a:t>6/22/2015</a:t>
             </a:fld>
             <a:endParaRPr lang="en-US" dirty="0"/>
           </a:p>
@@ -3995,7 +3999,7 @@
             <a:fld id="{D57F1E4F-1CFF-5643-939E-217C01CDF565}" type="slidenum">
               <a:rPr lang="en-US" dirty="0"/>
               <a:pPr/>
-              <a:t>‹#›</a:t>
+              <a:t>‹Nr.›</a:t>
             </a:fld>
             <a:endParaRPr lang="en-US" dirty="0"/>
           </a:p>
@@ -4289,7 +4293,7 @@
             <a:fld id="{B61BEF0D-F0BB-DE4B-95CE-6DB70DBA9567}" type="datetimeFigureOut">
               <a:rPr lang="en-US" dirty="0"/>
               <a:pPr/>
-              <a:t>6/21/2015</a:t>
+              <a:t>6/22/2015</a:t>
             </a:fld>
             <a:endParaRPr lang="en-US" dirty="0"/>
           </a:p>
@@ -4332,7 +4336,7 @@
             <a:fld id="{D57F1E4F-1CFF-5643-939E-217C01CDF565}" type="slidenum">
               <a:rPr lang="en-US" dirty="0"/>
               <a:pPr/>
-              <a:t>‹#›</a:t>
+              <a:t>‹Nr.›</a:t>
             </a:fld>
             <a:endParaRPr lang="en-US" dirty="0"/>
           </a:p>
@@ -4767,7 +4771,7 @@
             <a:fld id="{B61BEF0D-F0BB-DE4B-95CE-6DB70DBA9567}" type="datetimeFigureOut">
               <a:rPr lang="en-US" dirty="0"/>
               <a:pPr/>
-              <a:t>6/21/2015</a:t>
+              <a:t>6/22/2015</a:t>
             </a:fld>
             <a:endParaRPr lang="en-US" dirty="0"/>
           </a:p>
@@ -4810,7 +4814,7 @@
             <a:fld id="{D57F1E4F-1CFF-5643-939E-217C01CDF565}" type="slidenum">
               <a:rPr lang="en-US" dirty="0"/>
               <a:pPr/>
-              <a:t>‹#›</a:t>
+              <a:t>‹Nr.›</a:t>
             </a:fld>
             <a:endParaRPr lang="en-US" dirty="0"/>
           </a:p>
@@ -4919,7 +4923,7 @@
             <a:fld id="{B61BEF0D-F0BB-DE4B-95CE-6DB70DBA9567}" type="datetimeFigureOut">
               <a:rPr lang="en-US" dirty="0"/>
               <a:pPr/>
-              <a:t>6/21/2015</a:t>
+              <a:t>6/22/2015</a:t>
             </a:fld>
             <a:endParaRPr lang="en-US" dirty="0"/>
           </a:p>
@@ -4962,7 +4966,7 @@
             <a:fld id="{D57F1E4F-1CFF-5643-939E-217C01CDF565}" type="slidenum">
               <a:rPr lang="en-US" dirty="0"/>
               <a:pPr/>
-              <a:t>‹#›</a:t>
+              <a:t>‹Nr.›</a:t>
             </a:fld>
             <a:endParaRPr lang="en-US" dirty="0"/>
           </a:p>
@@ -5048,7 +5052,7 @@
             <a:fld id="{B61BEF0D-F0BB-DE4B-95CE-6DB70DBA9567}" type="datetimeFigureOut">
               <a:rPr lang="en-US" dirty="0"/>
               <a:pPr/>
-              <a:t>6/21/2015</a:t>
+              <a:t>6/22/2015</a:t>
             </a:fld>
             <a:endParaRPr lang="en-US" dirty="0"/>
           </a:p>
@@ -5091,7 +5095,7 @@
             <a:fld id="{D57F1E4F-1CFF-5643-939E-217C01CDF565}" type="slidenum">
               <a:rPr lang="en-US" dirty="0"/>
               <a:pPr/>
-              <a:t>‹#›</a:t>
+              <a:t>‹Nr.›</a:t>
             </a:fld>
             <a:endParaRPr lang="en-US" dirty="0"/>
           </a:p>
@@ -5365,7 +5369,7 @@
             <a:fld id="{B61BEF0D-F0BB-DE4B-95CE-6DB70DBA9567}" type="datetimeFigureOut">
               <a:rPr lang="en-US" dirty="0"/>
               <a:pPr/>
-              <a:t>6/21/2015</a:t>
+              <a:t>6/22/2015</a:t>
             </a:fld>
             <a:endParaRPr lang="en-US" dirty="0"/>
           </a:p>
@@ -5408,7 +5412,7 @@
             <a:fld id="{D57F1E4F-1CFF-5643-939E-217C01CDF565}" type="slidenum">
               <a:rPr lang="en-US" dirty="0"/>
               <a:pPr/>
-              <a:t>‹#›</a:t>
+              <a:t>‹Nr.›</a:t>
             </a:fld>
             <a:endParaRPr lang="en-US" dirty="0"/>
           </a:p>
@@ -5690,7 +5694,7 @@
             <a:fld id="{B61BEF0D-F0BB-DE4B-95CE-6DB70DBA9567}" type="datetimeFigureOut">
               <a:rPr lang="en-US" dirty="0"/>
               <a:pPr/>
-              <a:t>6/21/2015</a:t>
+              <a:t>6/22/2015</a:t>
             </a:fld>
             <a:endParaRPr lang="en-US" dirty="0"/>
           </a:p>
@@ -5733,7 +5737,7 @@
             <a:fld id="{D57F1E4F-1CFF-5643-939E-217C01CDF565}" type="slidenum">
               <a:rPr lang="en-US" dirty="0"/>
               <a:pPr/>
-              <a:t>‹#›</a:t>
+              <a:t>‹Nr.›</a:t>
             </a:fld>
             <a:endParaRPr lang="en-US" dirty="0"/>
           </a:p>
@@ -6254,7 +6258,7 @@
             <a:fld id="{B61BEF0D-F0BB-DE4B-95CE-6DB70DBA9567}" type="datetimeFigureOut">
               <a:rPr lang="en-US" dirty="0"/>
               <a:pPr/>
-              <a:t>6/21/2015</a:t>
+              <a:t>6/22/2015</a:t>
             </a:fld>
             <a:endParaRPr lang="en-US" dirty="0"/>
           </a:p>
@@ -6333,7 +6337,7 @@
             <a:fld id="{D57F1E4F-1CFF-5643-939E-217C01CDF565}" type="slidenum">
               <a:rPr lang="en-US" dirty="0"/>
               <a:pPr/>
-              <a:t>‹#›</a:t>
+              <a:t>‹Nr.›</a:t>
             </a:fld>
             <a:endParaRPr lang="en-US" dirty="0"/>
           </a:p>
@@ -6930,6 +6934,562 @@
       </p:grpSpPr>
       <p:sp>
         <p:nvSpPr>
+          <p:cNvPr id="2" name="Titel 1"/>
+          <p:cNvSpPr>
+            <a:spLocks noGrp="1"/>
+          </p:cNvSpPr>
+          <p:nvPr>
+            <p:ph type="title"/>
+          </p:nvPr>
+        </p:nvSpPr>
+        <p:spPr/>
+        <p:txBody>
+          <a:bodyPr/>
+          <a:lstStyle/>
+          <a:p>
+            <a:r>
+              <a:rPr lang="de-DE" dirty="0" smtClean="0"/>
+              <a:t>Client: Konzept Reaktivität</a:t>
+            </a:r>
+            <a:endParaRPr lang="de-DE" dirty="0"/>
+          </a:p>
+        </p:txBody>
+      </p:sp>
+      <p:pic>
+        <p:nvPicPr>
+          <p:cNvPr id="4" name="Grafik 3"/>
+          <p:cNvPicPr>
+            <a:picLocks noChangeAspect="1"/>
+          </p:cNvPicPr>
+          <p:nvPr/>
+        </p:nvPicPr>
+        <p:blipFill>
+          <a:blip r:embed="rId2">
+            <a:extLst>
+              <a:ext uri="{28A0092B-C50C-407E-A947-70E740481C1C}">
+                <a14:useLocalDpi xmlns:a14="http://schemas.microsoft.com/office/drawing/2010/main" val="0"/>
+              </a:ext>
+            </a:extLst>
+          </a:blip>
+          <a:stretch>
+            <a:fillRect/>
+          </a:stretch>
+        </p:blipFill>
+        <p:spPr>
+          <a:xfrm>
+            <a:off x="3696472" y="2628128"/>
+            <a:ext cx="4667250" cy="2952750"/>
+          </a:xfrm>
+          <a:prstGeom prst="rect">
+            <a:avLst/>
+          </a:prstGeom>
+        </p:spPr>
+      </p:pic>
+    </p:spTree>
+    <p:extLst>
+      <p:ext uri="{BB962C8B-B14F-4D97-AF65-F5344CB8AC3E}">
+        <p14:creationId xmlns:p14="http://schemas.microsoft.com/office/powerpoint/2010/main" val="1908598437"/>
+      </p:ext>
+    </p:extLst>
+  </p:cSld>
+  <p:clrMapOvr>
+    <a:masterClrMapping/>
+  </p:clrMapOvr>
+</p:sld>
+</file>
+
+<file path=ppt/slides/slide11.xml><?xml version="1.0" encoding="utf-8"?>
+<p:sld xmlns:a="http://schemas.openxmlformats.org/drawingml/2006/main" xmlns:r="http://schemas.openxmlformats.org/officeDocument/2006/relationships" xmlns:p="http://schemas.openxmlformats.org/presentationml/2006/main">
+  <p:cSld>
+    <p:spTree>
+      <p:nvGrpSpPr>
+        <p:cNvPr id="1" name=""/>
+        <p:cNvGrpSpPr/>
+        <p:nvPr/>
+      </p:nvGrpSpPr>
+      <p:grpSpPr>
+        <a:xfrm>
+          <a:off x="0" y="0"/>
+          <a:ext cx="0" cy="0"/>
+          <a:chOff x="0" y="0"/>
+          <a:chExt cx="0" cy="0"/>
+        </a:xfrm>
+      </p:grpSpPr>
+      <p:sp>
+        <p:nvSpPr>
+          <p:cNvPr id="2" name="Title 1"/>
+          <p:cNvSpPr>
+            <a:spLocks noGrp="1"/>
+          </p:cNvSpPr>
+          <p:nvPr>
+            <p:ph type="title"/>
+          </p:nvPr>
+        </p:nvSpPr>
+        <p:spPr/>
+        <p:txBody>
+          <a:bodyPr/>
+          <a:lstStyle/>
+          <a:p>
+            <a:r>
+              <a:rPr lang="de-DE" dirty="0" smtClean="0"/>
+              <a:t>Tests</a:t>
+            </a:r>
+            <a:endParaRPr lang="de-DE" dirty="0"/>
+          </a:p>
+        </p:txBody>
+      </p:sp>
+      <p:sp>
+        <p:nvSpPr>
+          <p:cNvPr id="3" name="Content Placeholder 2"/>
+          <p:cNvSpPr>
+            <a:spLocks noGrp="1"/>
+          </p:cNvSpPr>
+          <p:nvPr>
+            <p:ph idx="1"/>
+          </p:nvPr>
+        </p:nvSpPr>
+        <p:spPr/>
+        <p:txBody>
+          <a:bodyPr>
+            <a:normAutofit lnSpcReduction="10000"/>
+          </a:bodyPr>
+          <a:lstStyle/>
+          <a:p>
+            <a:r>
+              <a:rPr lang="de-DE" dirty="0" smtClean="0"/>
+              <a:t>Allgemein</a:t>
+            </a:r>
+          </a:p>
+          <a:p>
+            <a:pPr lvl="1"/>
+            <a:r>
+              <a:rPr lang="de-DE" dirty="0" err="1" smtClean="0"/>
+              <a:t>Seperate</a:t>
+            </a:r>
+            <a:r>
+              <a:rPr lang="de-DE" dirty="0" smtClean="0"/>
+              <a:t> Test-DB</a:t>
+            </a:r>
+          </a:p>
+          <a:p>
+            <a:pPr lvl="1"/>
+            <a:r>
+              <a:rPr lang="de-DE" dirty="0" smtClean="0"/>
+              <a:t>Ursprünglich </a:t>
+            </a:r>
+            <a:r>
+              <a:rPr lang="de-DE" dirty="0" err="1" smtClean="0"/>
+              <a:t>Activator</a:t>
+            </a:r>
+            <a:r>
+              <a:rPr lang="de-DE" dirty="0" smtClean="0"/>
+              <a:t> </a:t>
+            </a:r>
+            <a:r>
+              <a:rPr lang="de-DE" dirty="0" err="1" smtClean="0"/>
+              <a:t>JUnitklassen</a:t>
+            </a:r>
+            <a:r>
+              <a:rPr lang="de-DE" dirty="0" smtClean="0"/>
+              <a:t>,  ersetzt durch </a:t>
+            </a:r>
+            <a:r>
+              <a:rPr lang="de-DE" dirty="0" err="1" smtClean="0"/>
+              <a:t>seperaten</a:t>
+            </a:r>
+            <a:r>
+              <a:rPr lang="de-DE" dirty="0" smtClean="0"/>
+              <a:t> Testsocket</a:t>
+            </a:r>
+          </a:p>
+          <a:p>
+            <a:r>
+              <a:rPr lang="de-DE" dirty="0" err="1" smtClean="0"/>
+              <a:t>LoadWorker</a:t>
+            </a:r>
+            <a:r>
+              <a:rPr lang="de-DE" dirty="0" smtClean="0"/>
+              <a:t>: kurzer Test</a:t>
+            </a:r>
+          </a:p>
+          <a:p>
+            <a:r>
+              <a:rPr lang="de-DE" dirty="0" smtClean="0"/>
+              <a:t>DB: Simulation des </a:t>
+            </a:r>
+            <a:r>
+              <a:rPr lang="de-DE" dirty="0" err="1" smtClean="0"/>
+              <a:t>Aktorsystems</a:t>
+            </a:r>
+            <a:r>
+              <a:rPr lang="de-DE" dirty="0" smtClean="0"/>
+              <a:t> und Überprüfung der Antworten &amp; </a:t>
+            </a:r>
+            <a:r>
+              <a:rPr lang="de-DE" dirty="0" err="1" smtClean="0"/>
+              <a:t>Queries</a:t>
+            </a:r>
+            <a:endParaRPr lang="de-DE" dirty="0" smtClean="0"/>
+          </a:p>
+          <a:p>
+            <a:r>
+              <a:rPr lang="de-DE" dirty="0" err="1" smtClean="0"/>
+              <a:t>UIInstance</a:t>
+            </a:r>
+            <a:r>
+              <a:rPr lang="de-DE" dirty="0" smtClean="0"/>
+              <a:t> &amp; </a:t>
+            </a:r>
+            <a:r>
+              <a:rPr lang="de-DE" dirty="0" err="1" smtClean="0"/>
+              <a:t>Aktorsystem</a:t>
+            </a:r>
+            <a:r>
+              <a:rPr lang="de-DE" dirty="0" smtClean="0"/>
+              <a:t>: Simulation der Interaktion durch den </a:t>
+            </a:r>
+            <a:r>
+              <a:rPr lang="de-DE" dirty="0" err="1" smtClean="0"/>
+              <a:t>WebSocket</a:t>
+            </a:r>
+            <a:endParaRPr lang="de-DE" dirty="0" smtClean="0"/>
+          </a:p>
+          <a:p>
+            <a:r>
+              <a:rPr lang="de-DE" dirty="0" smtClean="0"/>
+              <a:t>Graph: Generierung von Daten in JS, statt aus </a:t>
+            </a:r>
+            <a:r>
+              <a:rPr lang="de-DE" dirty="0" err="1" smtClean="0"/>
+              <a:t>Aktorsystem</a:t>
+            </a:r>
+            <a:endParaRPr lang="de-DE" dirty="0"/>
+          </a:p>
+        </p:txBody>
+      </p:sp>
+    </p:spTree>
+    <p:extLst>
+      <p:ext uri="{BB962C8B-B14F-4D97-AF65-F5344CB8AC3E}">
+        <p14:creationId xmlns:p14="http://schemas.microsoft.com/office/powerpoint/2010/main" val="4133694229"/>
+      </p:ext>
+    </p:extLst>
+  </p:cSld>
+  <p:clrMapOvr>
+    <a:masterClrMapping/>
+  </p:clrMapOvr>
+</p:sld>
+</file>
+
+<file path=ppt/slides/slide12.xml><?xml version="1.0" encoding="utf-8"?>
+<p:sld xmlns:a="http://schemas.openxmlformats.org/drawingml/2006/main" xmlns:r="http://schemas.openxmlformats.org/officeDocument/2006/relationships" xmlns:p="http://schemas.openxmlformats.org/presentationml/2006/main">
+  <p:cSld>
+    <p:spTree>
+      <p:nvGrpSpPr>
+        <p:cNvPr id="1" name=""/>
+        <p:cNvGrpSpPr/>
+        <p:nvPr/>
+      </p:nvGrpSpPr>
+      <p:grpSpPr>
+        <a:xfrm>
+          <a:off x="0" y="0"/>
+          <a:ext cx="0" cy="0"/>
+          <a:chOff x="0" y="0"/>
+          <a:chExt cx="0" cy="0"/>
+        </a:xfrm>
+      </p:grpSpPr>
+      <p:sp>
+        <p:nvSpPr>
+          <p:cNvPr id="2" name="Title 1"/>
+          <p:cNvSpPr>
+            <a:spLocks noGrp="1"/>
+          </p:cNvSpPr>
+          <p:nvPr>
+            <p:ph type="title"/>
+          </p:nvPr>
+        </p:nvSpPr>
+        <p:spPr/>
+        <p:txBody>
+          <a:bodyPr/>
+          <a:lstStyle/>
+          <a:p>
+            <a:r>
+              <a:rPr lang="de-DE" dirty="0" smtClean="0"/>
+              <a:t>Reflexion - Designentscheidungen</a:t>
+            </a:r>
+            <a:endParaRPr lang="de-DE" dirty="0"/>
+          </a:p>
+        </p:txBody>
+      </p:sp>
+      <p:sp>
+        <p:nvSpPr>
+          <p:cNvPr id="3" name="Content Placeholder 2"/>
+          <p:cNvSpPr>
+            <a:spLocks noGrp="1"/>
+          </p:cNvSpPr>
+          <p:nvPr>
+            <p:ph idx="1"/>
+          </p:nvPr>
+        </p:nvSpPr>
+        <p:spPr/>
+        <p:txBody>
+          <a:bodyPr>
+            <a:normAutofit lnSpcReduction="10000"/>
+          </a:bodyPr>
+          <a:lstStyle/>
+          <a:p>
+            <a:r>
+              <a:rPr lang="de-DE" dirty="0" smtClean="0"/>
+              <a:t>Vollständiger Trace</a:t>
+            </a:r>
+          </a:p>
+          <a:p>
+            <a:pPr lvl="1"/>
+            <a:r>
+              <a:rPr lang="de-DE" dirty="0" smtClean="0"/>
+              <a:t>Sehr aufwendig</a:t>
+            </a:r>
+          </a:p>
+          <a:p>
+            <a:pPr lvl="1"/>
+            <a:r>
+              <a:rPr lang="de-DE" dirty="0" smtClean="0"/>
+              <a:t>Testlauf lässt sich später exakt laden &amp; abspielen</a:t>
+            </a:r>
+          </a:p>
+          <a:p>
+            <a:pPr lvl="1"/>
+            <a:r>
+              <a:rPr lang="de-DE" dirty="0" smtClean="0"/>
+              <a:t>Alternativen: Stichproben, teilweise aggregierte Daten</a:t>
+            </a:r>
+          </a:p>
+          <a:p>
+            <a:r>
+              <a:rPr lang="de-DE" dirty="0" smtClean="0"/>
+              <a:t>Data </a:t>
+            </a:r>
+            <a:r>
+              <a:rPr lang="de-DE" dirty="0" err="1" smtClean="0"/>
+              <a:t>Driven</a:t>
+            </a:r>
+            <a:r>
+              <a:rPr lang="de-DE" dirty="0" smtClean="0"/>
+              <a:t> </a:t>
+            </a:r>
+            <a:r>
+              <a:rPr lang="de-DE" dirty="0" err="1" smtClean="0"/>
+              <a:t>Documents</a:t>
+            </a:r>
+            <a:r>
+              <a:rPr lang="de-DE" dirty="0" smtClean="0"/>
+              <a:t> – Dynamisch aktualisierender Graph</a:t>
+            </a:r>
+          </a:p>
+          <a:p>
+            <a:pPr lvl="1"/>
+            <a:r>
+              <a:rPr lang="de-DE" dirty="0" smtClean="0"/>
+              <a:t>Zusammen mit vollständigem Trace sehr aufwendig</a:t>
+            </a:r>
+          </a:p>
+          <a:p>
+            <a:r>
+              <a:rPr lang="de-DE" dirty="0" smtClean="0"/>
+              <a:t>Tests durch Simulation</a:t>
+            </a:r>
+          </a:p>
+          <a:p>
+            <a:pPr lvl="1"/>
+            <a:r>
+              <a:rPr lang="de-DE" dirty="0" smtClean="0"/>
+              <a:t>Tests selbst sehr fehleranfällig</a:t>
+            </a:r>
+          </a:p>
+          <a:p>
+            <a:pPr lvl="1"/>
+            <a:r>
+              <a:rPr lang="de-DE" dirty="0" err="1" smtClean="0"/>
+              <a:t>Activator</a:t>
+            </a:r>
+            <a:r>
+              <a:rPr lang="de-DE" dirty="0" smtClean="0"/>
+              <a:t>-</a:t>
+            </a:r>
+            <a:r>
+              <a:rPr lang="de-DE" dirty="0" err="1" smtClean="0"/>
+              <a:t>JUnit</a:t>
+            </a:r>
+            <a:r>
+              <a:rPr lang="de-DE" dirty="0" smtClean="0"/>
+              <a:t>-Tests instabil</a:t>
+            </a:r>
+          </a:p>
+        </p:txBody>
+      </p:sp>
+    </p:spTree>
+    <p:extLst>
+      <p:ext uri="{BB962C8B-B14F-4D97-AF65-F5344CB8AC3E}">
+        <p14:creationId xmlns:p14="http://schemas.microsoft.com/office/powerpoint/2010/main" val="3403748733"/>
+      </p:ext>
+    </p:extLst>
+  </p:cSld>
+  <p:clrMapOvr>
+    <a:masterClrMapping/>
+  </p:clrMapOvr>
+</p:sld>
+</file>
+
+<file path=ppt/slides/slide13.xml><?xml version="1.0" encoding="utf-8"?>
+<p:sld xmlns:a="http://schemas.openxmlformats.org/drawingml/2006/main" xmlns:r="http://schemas.openxmlformats.org/officeDocument/2006/relationships" xmlns:p="http://schemas.openxmlformats.org/presentationml/2006/main">
+  <p:cSld>
+    <p:spTree>
+      <p:nvGrpSpPr>
+        <p:cNvPr id="1" name=""/>
+        <p:cNvGrpSpPr/>
+        <p:nvPr/>
+      </p:nvGrpSpPr>
+      <p:grpSpPr>
+        <a:xfrm>
+          <a:off x="0" y="0"/>
+          <a:ext cx="0" cy="0"/>
+          <a:chOff x="0" y="0"/>
+          <a:chExt cx="0" cy="0"/>
+        </a:xfrm>
+      </p:grpSpPr>
+      <p:sp>
+        <p:nvSpPr>
+          <p:cNvPr id="2" name="Title 1"/>
+          <p:cNvSpPr>
+            <a:spLocks noGrp="1"/>
+          </p:cNvSpPr>
+          <p:nvPr>
+            <p:ph type="title"/>
+          </p:nvPr>
+        </p:nvSpPr>
+        <p:spPr/>
+        <p:txBody>
+          <a:bodyPr/>
+          <a:lstStyle/>
+          <a:p>
+            <a:r>
+              <a:rPr lang="de-DE" dirty="0" smtClean="0"/>
+              <a:t>Reflexion - Frameworks</a:t>
+            </a:r>
+            <a:endParaRPr lang="de-DE" dirty="0"/>
+          </a:p>
+        </p:txBody>
+      </p:sp>
+      <p:sp>
+        <p:nvSpPr>
+          <p:cNvPr id="3" name="Content Placeholder 2"/>
+          <p:cNvSpPr>
+            <a:spLocks noGrp="1"/>
+          </p:cNvSpPr>
+          <p:nvPr>
+            <p:ph idx="1"/>
+          </p:nvPr>
+        </p:nvSpPr>
+        <p:spPr/>
+        <p:txBody>
+          <a:bodyPr>
+            <a:normAutofit/>
+          </a:bodyPr>
+          <a:lstStyle/>
+          <a:p>
+            <a:r>
+              <a:rPr lang="de-DE" dirty="0" smtClean="0"/>
+              <a:t>D3JS</a:t>
+            </a:r>
+          </a:p>
+          <a:p>
+            <a:pPr lvl="1"/>
+            <a:r>
+              <a:rPr lang="de-DE" dirty="0" smtClean="0"/>
+              <a:t>Sehr interessant &amp; flexibel</a:t>
+            </a:r>
+          </a:p>
+          <a:p>
+            <a:pPr lvl="1"/>
+            <a:r>
+              <a:rPr lang="de-DE" dirty="0" smtClean="0"/>
+              <a:t>Performancehungrig</a:t>
+            </a:r>
+          </a:p>
+          <a:p>
+            <a:r>
+              <a:rPr lang="de-DE" dirty="0" smtClean="0"/>
+              <a:t>Play (insbesondere JSON)</a:t>
+            </a:r>
+          </a:p>
+          <a:p>
+            <a:pPr lvl="1"/>
+            <a:r>
+              <a:rPr lang="de-DE" dirty="0" smtClean="0"/>
+              <a:t>Prinzipiell gut, aber teilweise nur mit Scala gut benutzbar</a:t>
+            </a:r>
+          </a:p>
+          <a:p>
+            <a:r>
+              <a:rPr lang="de-DE" dirty="0" smtClean="0"/>
+              <a:t>Scala</a:t>
+            </a:r>
+          </a:p>
+          <a:p>
+            <a:pPr lvl="1"/>
+            <a:r>
+              <a:rPr lang="de-DE" dirty="0" smtClean="0"/>
+              <a:t>Hätten wir von Anfang an nutzen sollen</a:t>
+            </a:r>
+          </a:p>
+          <a:p>
+            <a:pPr lvl="1"/>
+            <a:r>
+              <a:rPr lang="de-DE" dirty="0" smtClean="0"/>
+              <a:t>Futures/</a:t>
+            </a:r>
+            <a:r>
+              <a:rPr lang="de-DE" dirty="0" err="1" smtClean="0"/>
+              <a:t>Promises</a:t>
+            </a:r>
+            <a:r>
+              <a:rPr lang="de-DE" dirty="0" smtClean="0"/>
+              <a:t>: Sehr intuitiv &amp; nützlich</a:t>
+            </a:r>
+          </a:p>
+        </p:txBody>
+      </p:sp>
+    </p:spTree>
+    <p:extLst>
+      <p:ext uri="{BB962C8B-B14F-4D97-AF65-F5344CB8AC3E}">
+        <p14:creationId xmlns:p14="http://schemas.microsoft.com/office/powerpoint/2010/main" val="3254996429"/>
+      </p:ext>
+    </p:extLst>
+  </p:cSld>
+  <p:clrMapOvr>
+    <a:masterClrMapping/>
+  </p:clrMapOvr>
+</p:sld>
+</file>
+
+<file path=ppt/slides/slide14.xml><?xml version="1.0" encoding="utf-8"?>
+<p:sld xmlns:a="http://schemas.openxmlformats.org/drawingml/2006/main" xmlns:r="http://schemas.openxmlformats.org/officeDocument/2006/relationships" xmlns:p="http://schemas.openxmlformats.org/presentationml/2006/main">
+  <p:cSld>
+    <p:spTree>
+      <p:nvGrpSpPr>
+        <p:cNvPr id="1" name=""/>
+        <p:cNvGrpSpPr/>
+        <p:nvPr/>
+      </p:nvGrpSpPr>
+      <p:grpSpPr>
+        <a:xfrm>
+          <a:off x="0" y="0"/>
+          <a:ext cx="0" cy="0"/>
+          <a:chOff x="0" y="0"/>
+          <a:chExt cx="0" cy="0"/>
+        </a:xfrm>
+      </p:grpSpPr>
+      <p:sp>
+        <p:nvSpPr>
           <p:cNvPr id="2" name="Title 1"/>
           <p:cNvSpPr>
             <a:spLocks noGrp="1"/>
@@ -7587,16 +8147,11 @@
               <a:rPr lang="de-DE" dirty="0" smtClean="0"/>
               <a:t>)</a:t>
             </a:r>
-            <a:endParaRPr lang="de-DE" dirty="0" smtClean="0"/>
-          </a:p>
-          <a:p>
-            <a:r>
-              <a:rPr lang="de-DE" dirty="0" smtClean="0"/>
-              <a:t>User</a:t>
-            </a:r>
-            <a:r>
-              <a:rPr lang="de-DE" dirty="0" smtClean="0"/>
-              <a:t>: {_</a:t>
+          </a:p>
+          <a:p>
+            <a:r>
+              <a:rPr lang="de-DE" dirty="0" smtClean="0"/>
+              <a:t>User: {_</a:t>
             </a:r>
             <a:r>
               <a:rPr lang="de-DE" dirty="0" err="1" smtClean="0"/>
@@ -7757,11 +8312,7 @@
             </a:r>
             <a:r>
               <a:rPr lang="de-DE" dirty="0" smtClean="0"/>
-              <a:t>, </a:t>
-            </a:r>
-            <a:r>
-              <a:rPr lang="de-DE" dirty="0" smtClean="0"/>
-              <a:t>end, </a:t>
+              <a:t>, end, </a:t>
             </a:r>
             <a:r>
               <a:rPr lang="de-DE" dirty="0" err="1" smtClean="0"/>
@@ -7890,7 +8441,7 @@
       </p:grpSpPr>
       <p:sp>
         <p:nvSpPr>
-          <p:cNvPr id="2" name="Title 1"/>
+          <p:cNvPr id="2" name="Titel 1"/>
           <p:cNvSpPr>
             <a:spLocks noGrp="1"/>
           </p:cNvSpPr>
@@ -7905,7 +8456,7 @@
           <a:p>
             <a:r>
               <a:rPr lang="de-DE" dirty="0" smtClean="0"/>
-              <a:t>Tests</a:t>
+              <a:t>User Interface</a:t>
             </a:r>
             <a:endParaRPr lang="de-DE" dirty="0"/>
           </a:p>
@@ -7913,7 +8464,7 @@
       </p:sp>
       <p:sp>
         <p:nvSpPr>
-          <p:cNvPr id="3" name="Content Placeholder 2"/>
+          <p:cNvPr id="3" name="Inhaltsplatzhalter 2"/>
           <p:cNvSpPr>
             <a:spLocks noGrp="1"/>
           </p:cNvSpPr>
@@ -7921,121 +8472,57 @@
             <p:ph idx="1"/>
           </p:nvPr>
         </p:nvSpPr>
-        <p:spPr/>
-        <p:txBody>
-          <a:bodyPr>
-            <a:normAutofit lnSpcReduction="10000"/>
-          </a:bodyPr>
+        <p:spPr>
+          <a:xfrm>
+            <a:off x="2269672" y="2172729"/>
+            <a:ext cx="9233352" cy="4027715"/>
+          </a:xfrm>
+        </p:spPr>
+        <p:txBody>
+          <a:bodyPr/>
           <a:lstStyle/>
           <a:p>
             <a:r>
-              <a:rPr lang="de-DE" dirty="0" smtClean="0"/>
-              <a:t>Allgemein</a:t>
-            </a:r>
-          </a:p>
-          <a:p>
-            <a:pPr lvl="1"/>
-            <a:r>
               <a:rPr lang="de-DE" dirty="0" err="1" smtClean="0"/>
-              <a:t>Seperate</a:t>
-            </a:r>
-            <a:r>
-              <a:rPr lang="de-DE" dirty="0" smtClean="0"/>
-              <a:t> Test-DB</a:t>
-            </a:r>
-          </a:p>
-          <a:p>
-            <a:pPr lvl="1"/>
-            <a:r>
-              <a:rPr lang="de-DE" dirty="0" smtClean="0"/>
-              <a:t>Ursprünglich </a:t>
+              <a:t>One</a:t>
+            </a:r>
+            <a:r>
+              <a:rPr lang="de-DE" dirty="0" smtClean="0"/>
+              <a:t>-Pager</a:t>
+            </a:r>
+          </a:p>
+          <a:p>
+            <a:r>
+              <a:rPr lang="de-DE" dirty="0" smtClean="0"/>
+              <a:t>Websocket Verbindung zum Aktor „UI-Instance“ über eingebettetes JavaScript</a:t>
+            </a:r>
+          </a:p>
+          <a:p>
+            <a:r>
+              <a:rPr lang="de-DE" dirty="0" smtClean="0"/>
+              <a:t>Aktualisiert Inhalte „sofort“ auf Server-push über den Websocket ohne Request-Response (Formular Daten, Testplan speichern, </a:t>
             </a:r>
             <a:r>
               <a:rPr lang="de-DE" dirty="0" err="1" smtClean="0"/>
-              <a:t>Activator</a:t>
+              <a:t>Testrun</a:t>
             </a:r>
             <a:r>
               <a:rPr lang="de-DE" dirty="0" smtClean="0"/>
               <a:t> </a:t>
             </a:r>
             <a:r>
-              <a:rPr lang="de-DE" dirty="0" err="1" smtClean="0"/>
-              <a:t>JUnitklassen</a:t>
-            </a:r>
-            <a:r>
-              <a:rPr lang="de-DE" dirty="0" smtClean="0"/>
-              <a:t>,  ersetzt durch </a:t>
-            </a:r>
-            <a:r>
-              <a:rPr lang="de-DE" dirty="0" err="1" smtClean="0"/>
-              <a:t>seperaten</a:t>
-            </a:r>
-            <a:r>
-              <a:rPr lang="de-DE" dirty="0" smtClean="0"/>
-              <a:t> Testsocket</a:t>
-            </a:r>
-            <a:endParaRPr lang="de-DE" dirty="0" smtClean="0"/>
-          </a:p>
-          <a:p>
-            <a:r>
-              <a:rPr lang="de-DE" dirty="0" err="1" smtClean="0"/>
-              <a:t>LoadWorker</a:t>
-            </a:r>
-            <a:r>
-              <a:rPr lang="de-DE" dirty="0" smtClean="0"/>
-              <a:t>: kurzer Test</a:t>
-            </a:r>
-          </a:p>
-          <a:p>
-            <a:r>
-              <a:rPr lang="de-DE" dirty="0" smtClean="0"/>
-              <a:t>DB: Simulation des </a:t>
-            </a:r>
-            <a:r>
-              <a:rPr lang="de-DE" dirty="0" err="1" smtClean="0"/>
-              <a:t>Aktorsystems</a:t>
-            </a:r>
-            <a:r>
-              <a:rPr lang="de-DE" dirty="0" smtClean="0"/>
-              <a:t> und Überprüfung der Antworten &amp; </a:t>
-            </a:r>
-            <a:r>
-              <a:rPr lang="de-DE" dirty="0" err="1" smtClean="0"/>
-              <a:t>Queries</a:t>
-            </a:r>
-            <a:endParaRPr lang="de-DE" dirty="0" smtClean="0"/>
-          </a:p>
-          <a:p>
-            <a:r>
-              <a:rPr lang="de-DE" dirty="0" err="1" smtClean="0"/>
-              <a:t>UIInstance</a:t>
-            </a:r>
-            <a:r>
-              <a:rPr lang="de-DE" dirty="0" smtClean="0"/>
-              <a:t> &amp; </a:t>
-            </a:r>
-            <a:r>
-              <a:rPr lang="de-DE" dirty="0" err="1" smtClean="0"/>
-              <a:t>Aktorsystem</a:t>
-            </a:r>
-            <a:r>
-              <a:rPr lang="de-DE" dirty="0" smtClean="0"/>
-              <a:t>: Simulation der Interaktion durch den </a:t>
-            </a:r>
-            <a:r>
-              <a:rPr lang="de-DE" dirty="0" err="1" smtClean="0"/>
-              <a:t>WebSocket</a:t>
-            </a:r>
-            <a:endParaRPr lang="de-DE" dirty="0" smtClean="0"/>
-          </a:p>
-          <a:p>
-            <a:r>
-              <a:rPr lang="de-DE" dirty="0" smtClean="0"/>
-              <a:t>Graph: Generierung von Daten in JS, statt aus </a:t>
-            </a:r>
-            <a:r>
-              <a:rPr lang="de-DE" dirty="0" err="1" smtClean="0"/>
-              <a:t>Aktorsystem</a:t>
+              <a:rPr lang="de-DE" dirty="0" smtClean="0">
+                <a:sym typeface="Wingdings" panose="05000000000000000000" pitchFamily="2" charset="2"/>
+              </a:rPr>
+              <a:t> Graph)</a:t>
+            </a:r>
+          </a:p>
+          <a:p>
+            <a:r>
+              <a:rPr lang="de-DE" dirty="0" smtClean="0">
+                <a:sym typeface="Wingdings" panose="05000000000000000000" pitchFamily="2" charset="2"/>
+              </a:rPr>
+              <a:t>D3Js Graph – fügt sofort neue Testergebnisse vom Server als neues DOM-Element in den Graphen ein und passt dynamisch Skalar und Größe der Datenpunkte an</a:t>
             </a:r>
             <a:endParaRPr lang="de-DE" dirty="0"/>
           </a:p>
@@ -8044,7 +8531,7 @@
     </p:spTree>
     <p:extLst>
       <p:ext uri="{BB962C8B-B14F-4D97-AF65-F5344CB8AC3E}">
-        <p14:creationId xmlns:p14="http://schemas.microsoft.com/office/powerpoint/2010/main" val="4133694229"/>
+        <p14:creationId xmlns:p14="http://schemas.microsoft.com/office/powerpoint/2010/main" val="2536661829"/>
       </p:ext>
     </p:extLst>
   </p:cSld>
@@ -8073,7 +8560,7 @@
       </p:grpSpPr>
       <p:sp>
         <p:nvSpPr>
-          <p:cNvPr id="2" name="Title 1"/>
+          <p:cNvPr id="2" name="Titel 1"/>
           <p:cNvSpPr>
             <a:spLocks noGrp="1"/>
           </p:cNvSpPr>
@@ -8088,122 +8575,46 @@
           <a:p>
             <a:r>
               <a:rPr lang="de-DE" dirty="0" smtClean="0"/>
-              <a:t>Reflexion - Designentscheidungen</a:t>
+              <a:t>Client: Prozess Testplan anlegen</a:t>
             </a:r>
             <a:endParaRPr lang="de-DE" dirty="0"/>
           </a:p>
         </p:txBody>
       </p:sp>
-      <p:sp>
-        <p:nvSpPr>
-          <p:cNvPr id="3" name="Content Placeholder 2"/>
-          <p:cNvSpPr>
-            <a:spLocks noGrp="1"/>
-          </p:cNvSpPr>
-          <p:nvPr>
-            <p:ph idx="1"/>
-          </p:nvPr>
-        </p:nvSpPr>
-        <p:spPr/>
-        <p:txBody>
-          <a:bodyPr>
-            <a:normAutofit lnSpcReduction="10000"/>
-          </a:bodyPr>
-          <a:lstStyle/>
-          <a:p>
-            <a:r>
-              <a:rPr lang="de-DE" dirty="0" smtClean="0"/>
-              <a:t>Vollständiger Trace</a:t>
-            </a:r>
-          </a:p>
-          <a:p>
-            <a:pPr lvl="1"/>
-            <a:r>
-              <a:rPr lang="de-DE" dirty="0" smtClean="0"/>
-              <a:t>Sehr aufwendig</a:t>
-            </a:r>
-          </a:p>
-          <a:p>
-            <a:pPr lvl="1"/>
-            <a:r>
-              <a:rPr lang="de-DE" dirty="0" smtClean="0"/>
-              <a:t>Testlauf lässt sich später exakt laden &amp; abspielen</a:t>
-            </a:r>
-          </a:p>
-          <a:p>
-            <a:pPr lvl="1"/>
-            <a:r>
-              <a:rPr lang="de-DE" dirty="0" smtClean="0"/>
-              <a:t>Alternativen: Stichproben, teilweise aggregierte Daten</a:t>
-            </a:r>
-          </a:p>
-          <a:p>
-            <a:r>
-              <a:rPr lang="de-DE" dirty="0" smtClean="0"/>
-              <a:t>Data </a:t>
-            </a:r>
-            <a:r>
-              <a:rPr lang="de-DE" dirty="0" err="1" smtClean="0"/>
-              <a:t>Driven</a:t>
-            </a:r>
-            <a:r>
-              <a:rPr lang="de-DE" dirty="0" smtClean="0"/>
-              <a:t> </a:t>
-            </a:r>
-            <a:r>
-              <a:rPr lang="de-DE" dirty="0" err="1" smtClean="0"/>
-              <a:t>Documents</a:t>
-            </a:r>
-            <a:r>
-              <a:rPr lang="de-DE" dirty="0" smtClean="0"/>
-              <a:t> – Dynamisch aktualisierender Graph</a:t>
-            </a:r>
-          </a:p>
-          <a:p>
-            <a:pPr lvl="1"/>
-            <a:r>
-              <a:rPr lang="de-DE" dirty="0" smtClean="0"/>
-              <a:t>Zusammen mit vollständigem Trace sehr aufwendig</a:t>
-            </a:r>
-          </a:p>
-          <a:p>
-            <a:r>
-              <a:rPr lang="de-DE" dirty="0" smtClean="0"/>
-              <a:t>Tests durch Simulation</a:t>
-            </a:r>
-          </a:p>
-          <a:p>
-            <a:pPr lvl="1"/>
-            <a:r>
-              <a:rPr lang="de-DE" dirty="0" smtClean="0"/>
-              <a:t>Tests selbst sehr fehleranfällig</a:t>
-            </a:r>
-          </a:p>
-          <a:p>
-            <a:pPr lvl="1"/>
-            <a:r>
-              <a:rPr lang="de-DE" dirty="0" err="1" smtClean="0"/>
-              <a:t>Activator</a:t>
-            </a:r>
-            <a:r>
-              <a:rPr lang="de-DE" dirty="0" smtClean="0"/>
-              <a:t>-</a:t>
-            </a:r>
-            <a:r>
-              <a:rPr lang="de-DE" dirty="0" err="1" smtClean="0"/>
-              <a:t>JUnit</a:t>
-            </a:r>
-            <a:r>
-              <a:rPr lang="de-DE" dirty="0" smtClean="0"/>
-              <a:t>-Tests instabil</a:t>
-            </a:r>
-          </a:p>
-        </p:txBody>
-      </p:sp>
+      <p:pic>
+        <p:nvPicPr>
+          <p:cNvPr id="4" name="Grafik 3"/>
+          <p:cNvPicPr>
+            <a:picLocks noChangeAspect="1"/>
+          </p:cNvPicPr>
+          <p:nvPr/>
+        </p:nvPicPr>
+        <p:blipFill>
+          <a:blip r:embed="rId2">
+            <a:extLst>
+              <a:ext uri="{28A0092B-C50C-407E-A947-70E740481C1C}">
+                <a14:useLocalDpi xmlns:a14="http://schemas.microsoft.com/office/drawing/2010/main" val="0"/>
+              </a:ext>
+            </a:extLst>
+          </a:blip>
+          <a:stretch>
+            <a:fillRect/>
+          </a:stretch>
+        </p:blipFill>
+        <p:spPr>
+          <a:xfrm>
+            <a:off x="476250" y="2695832"/>
+            <a:ext cx="11239500" cy="3048000"/>
+          </a:xfrm>
+          <a:prstGeom prst="rect">
+            <a:avLst/>
+          </a:prstGeom>
+        </p:spPr>
+      </p:pic>
     </p:spTree>
     <p:extLst>
       <p:ext uri="{BB962C8B-B14F-4D97-AF65-F5344CB8AC3E}">
-        <p14:creationId xmlns:p14="http://schemas.microsoft.com/office/powerpoint/2010/main" val="3403748733"/>
+        <p14:creationId xmlns:p14="http://schemas.microsoft.com/office/powerpoint/2010/main" val="290849107"/>
       </p:ext>
     </p:extLst>
   </p:cSld>
@@ -8232,7 +8643,7 @@
       </p:grpSpPr>
       <p:sp>
         <p:nvSpPr>
-          <p:cNvPr id="2" name="Title 1"/>
+          <p:cNvPr id="4" name="Titel 1"/>
           <p:cNvSpPr>
             <a:spLocks noGrp="1"/>
           </p:cNvSpPr>
@@ -8240,102 +8651,58 @@
             <p:ph type="title"/>
           </p:nvPr>
         </p:nvSpPr>
-        <p:spPr/>
+        <p:spPr>
+          <a:xfrm>
+            <a:off x="1484311" y="685800"/>
+            <a:ext cx="10018713" cy="1752599"/>
+          </a:xfrm>
+        </p:spPr>
         <p:txBody>
           <a:bodyPr/>
           <a:lstStyle/>
           <a:p>
             <a:r>
               <a:rPr lang="de-DE" dirty="0" smtClean="0"/>
-              <a:t>Reflexion - Frameworks</a:t>
+              <a:t>Client: Prozess Testplan ausführen</a:t>
             </a:r>
             <a:endParaRPr lang="de-DE" dirty="0"/>
           </a:p>
         </p:txBody>
       </p:sp>
-      <p:sp>
-        <p:nvSpPr>
-          <p:cNvPr id="3" name="Content Placeholder 2"/>
-          <p:cNvSpPr>
-            <a:spLocks noGrp="1"/>
-          </p:cNvSpPr>
-          <p:nvPr>
-            <p:ph idx="1"/>
-          </p:nvPr>
-        </p:nvSpPr>
-        <p:spPr/>
-        <p:txBody>
-          <a:bodyPr>
-            <a:normAutofit/>
-          </a:bodyPr>
-          <a:lstStyle/>
-          <a:p>
-            <a:r>
-              <a:rPr lang="de-DE" dirty="0" smtClean="0"/>
-              <a:t>D3JS</a:t>
-            </a:r>
-          </a:p>
-          <a:p>
-            <a:pPr lvl="1"/>
-            <a:r>
-              <a:rPr lang="de-DE" dirty="0" smtClean="0"/>
-              <a:t>Sehr interessant &amp; flexibel</a:t>
-            </a:r>
-          </a:p>
-          <a:p>
-            <a:pPr lvl="1"/>
-            <a:r>
-              <a:rPr lang="de-DE" dirty="0" smtClean="0"/>
-              <a:t>Performancehungrig</a:t>
-            </a:r>
-          </a:p>
-          <a:p>
-            <a:r>
-              <a:rPr lang="de-DE" dirty="0" smtClean="0"/>
-              <a:t>Play (insbesondere JSON)</a:t>
-            </a:r>
-          </a:p>
-          <a:p>
-            <a:pPr lvl="1"/>
-            <a:r>
-              <a:rPr lang="de-DE" dirty="0" smtClean="0"/>
-              <a:t>Prinzipiell gut, aber teilweise nur mit Scala gut benutzbar</a:t>
-            </a:r>
-          </a:p>
-          <a:p>
-            <a:r>
-              <a:rPr lang="de-DE" dirty="0" smtClean="0"/>
-              <a:t>Scala</a:t>
-            </a:r>
-          </a:p>
-          <a:p>
-            <a:pPr lvl="1"/>
-            <a:r>
-              <a:rPr lang="de-DE" dirty="0" smtClean="0"/>
-              <a:t>Hätten wir von Anfang an nutzen sollen</a:t>
-            </a:r>
-          </a:p>
-          <a:p>
-            <a:pPr lvl="1"/>
-            <a:r>
-              <a:rPr lang="de-DE" dirty="0" smtClean="0"/>
-              <a:t>Futures/</a:t>
-            </a:r>
-            <a:r>
-              <a:rPr lang="de-DE" dirty="0" err="1" smtClean="0"/>
-              <a:t>Promises</a:t>
-            </a:r>
-            <a:r>
-              <a:rPr lang="de-DE" dirty="0" smtClean="0"/>
-              <a:t>: Sehr intuitiv &amp; nützlich</a:t>
-            </a:r>
-          </a:p>
-        </p:txBody>
-      </p:sp>
+      <p:pic>
+        <p:nvPicPr>
+          <p:cNvPr id="5" name="Grafik 4"/>
+          <p:cNvPicPr>
+            <a:picLocks noChangeAspect="1"/>
+          </p:cNvPicPr>
+          <p:nvPr/>
+        </p:nvPicPr>
+        <p:blipFill>
+          <a:blip r:embed="rId2">
+            <a:extLst>
+              <a:ext uri="{28A0092B-C50C-407E-A947-70E740481C1C}">
+                <a14:useLocalDpi xmlns:a14="http://schemas.microsoft.com/office/drawing/2010/main" val="0"/>
+              </a:ext>
+            </a:extLst>
+          </a:blip>
+          <a:stretch>
+            <a:fillRect/>
+          </a:stretch>
+        </p:blipFill>
+        <p:spPr>
+          <a:xfrm>
+            <a:off x="1484311" y="2679357"/>
+            <a:ext cx="9239250" cy="3048000"/>
+          </a:xfrm>
+          <a:prstGeom prst="rect">
+            <a:avLst/>
+          </a:prstGeom>
+        </p:spPr>
+      </p:pic>
     </p:spTree>
     <p:extLst>
       <p:ext uri="{BB962C8B-B14F-4D97-AF65-F5344CB8AC3E}">
-        <p14:creationId xmlns:p14="http://schemas.microsoft.com/office/powerpoint/2010/main" val="3254996429"/>
+        <p14:creationId xmlns:p14="http://schemas.microsoft.com/office/powerpoint/2010/main" val="779776639"/>
       </p:ext>
     </p:extLst>
   </p:cSld>

</xml_diff>